<commit_message>
last updates to presentation
</commit_message>
<xml_diff>
--- a/team-presentation/team_presentation.pptx
+++ b/team-presentation/team_presentation.pptx
@@ -24,23 +24,24 @@
     <p:sldId id="277" r:id="rId18"/>
     <p:sldId id="278" r:id="rId19"/>
     <p:sldId id="279" r:id="rId20"/>
-    <p:sldId id="280" r:id="rId21"/>
-    <p:sldId id="281" r:id="rId22"/>
-    <p:sldId id="283" r:id="rId23"/>
-    <p:sldId id="284" r:id="rId24"/>
-    <p:sldId id="285" r:id="rId25"/>
-    <p:sldId id="287" r:id="rId26"/>
-    <p:sldId id="289" r:id="rId27"/>
-    <p:sldId id="299" r:id="rId28"/>
-    <p:sldId id="291" r:id="rId29"/>
-    <p:sldId id="292" r:id="rId30"/>
-    <p:sldId id="293" r:id="rId31"/>
-    <p:sldId id="294" r:id="rId32"/>
-    <p:sldId id="295" r:id="rId33"/>
-    <p:sldId id="296" r:id="rId34"/>
-    <p:sldId id="297" r:id="rId35"/>
-    <p:sldId id="300" r:id="rId36"/>
-    <p:sldId id="301" r:id="rId37"/>
+    <p:sldId id="302" r:id="rId21"/>
+    <p:sldId id="280" r:id="rId22"/>
+    <p:sldId id="281" r:id="rId23"/>
+    <p:sldId id="283" r:id="rId24"/>
+    <p:sldId id="284" r:id="rId25"/>
+    <p:sldId id="285" r:id="rId26"/>
+    <p:sldId id="287" r:id="rId27"/>
+    <p:sldId id="289" r:id="rId28"/>
+    <p:sldId id="299" r:id="rId29"/>
+    <p:sldId id="291" r:id="rId30"/>
+    <p:sldId id="292" r:id="rId31"/>
+    <p:sldId id="293" r:id="rId32"/>
+    <p:sldId id="294" r:id="rId33"/>
+    <p:sldId id="295" r:id="rId34"/>
+    <p:sldId id="296" r:id="rId35"/>
+    <p:sldId id="297" r:id="rId36"/>
+    <p:sldId id="300" r:id="rId37"/>
+    <p:sldId id="301" r:id="rId38"/>
   </p:sldIdLst>
   <p:sldSz cx="12192000" cy="6858000"/>
   <p:notesSz cx="6858000" cy="9144000"/>
@@ -139,6 +140,11 @@
       </a:defRPr>
     </a:lvl9pPr>
   </p:defaultTextStyle>
+  <p:extLst>
+    <p:ext uri="{EFAFB233-063F-42B5-8137-9DF3F51BA10A}">
+      <p15:sldGuideLst xmlns:p15="http://schemas.microsoft.com/office/powerpoint/2012/main"/>
+    </p:ext>
+  </p:extLst>
 </p:presentation>
 </file>
 
@@ -291,7 +297,7 @@
           <a:p>
             <a:fld id="{B540E1C3-36CE-42FB-8D35-9E01D658BDEC}" type="datetimeFigureOut">
               <a:rPr lang="en-AU" smtClean="0"/>
-              <a:t>14/9/22</a:t>
+              <a:t>15/9/22</a:t>
             </a:fld>
             <a:endParaRPr lang="en-AU"/>
           </a:p>
@@ -491,7 +497,7 @@
           <a:p>
             <a:fld id="{B540E1C3-36CE-42FB-8D35-9E01D658BDEC}" type="datetimeFigureOut">
               <a:rPr lang="en-AU" smtClean="0"/>
-              <a:t>14/9/22</a:t>
+              <a:t>15/9/22</a:t>
             </a:fld>
             <a:endParaRPr lang="en-AU"/>
           </a:p>
@@ -701,7 +707,7 @@
           <a:p>
             <a:fld id="{B540E1C3-36CE-42FB-8D35-9E01D658BDEC}" type="datetimeFigureOut">
               <a:rPr lang="en-AU" smtClean="0"/>
-              <a:t>14/9/22</a:t>
+              <a:t>15/9/22</a:t>
             </a:fld>
             <a:endParaRPr lang="en-AU"/>
           </a:p>
@@ -901,7 +907,7 @@
           <a:p>
             <a:fld id="{B540E1C3-36CE-42FB-8D35-9E01D658BDEC}" type="datetimeFigureOut">
               <a:rPr lang="en-AU" smtClean="0"/>
-              <a:t>14/9/22</a:t>
+              <a:t>15/9/22</a:t>
             </a:fld>
             <a:endParaRPr lang="en-AU"/>
           </a:p>
@@ -1177,7 +1183,7 @@
           <a:p>
             <a:fld id="{B540E1C3-36CE-42FB-8D35-9E01D658BDEC}" type="datetimeFigureOut">
               <a:rPr lang="en-AU" smtClean="0"/>
-              <a:t>14/9/22</a:t>
+              <a:t>15/9/22</a:t>
             </a:fld>
             <a:endParaRPr lang="en-AU"/>
           </a:p>
@@ -1445,7 +1451,7 @@
           <a:p>
             <a:fld id="{B540E1C3-36CE-42FB-8D35-9E01D658BDEC}" type="datetimeFigureOut">
               <a:rPr lang="en-AU" smtClean="0"/>
-              <a:t>14/9/22</a:t>
+              <a:t>15/9/22</a:t>
             </a:fld>
             <a:endParaRPr lang="en-AU"/>
           </a:p>
@@ -1860,7 +1866,7 @@
           <a:p>
             <a:fld id="{B540E1C3-36CE-42FB-8D35-9E01D658BDEC}" type="datetimeFigureOut">
               <a:rPr lang="en-AU" smtClean="0"/>
-              <a:t>14/9/22</a:t>
+              <a:t>15/9/22</a:t>
             </a:fld>
             <a:endParaRPr lang="en-AU"/>
           </a:p>
@@ -2002,7 +2008,7 @@
           <a:p>
             <a:fld id="{B540E1C3-36CE-42FB-8D35-9E01D658BDEC}" type="datetimeFigureOut">
               <a:rPr lang="en-AU" smtClean="0"/>
-              <a:t>14/9/22</a:t>
+              <a:t>15/9/22</a:t>
             </a:fld>
             <a:endParaRPr lang="en-AU"/>
           </a:p>
@@ -2115,7 +2121,7 @@
           <a:p>
             <a:fld id="{B540E1C3-36CE-42FB-8D35-9E01D658BDEC}" type="datetimeFigureOut">
               <a:rPr lang="en-AU" smtClean="0"/>
-              <a:t>14/9/22</a:t>
+              <a:t>15/9/22</a:t>
             </a:fld>
             <a:endParaRPr lang="en-AU"/>
           </a:p>
@@ -2428,7 +2434,7 @@
           <a:p>
             <a:fld id="{B540E1C3-36CE-42FB-8D35-9E01D658BDEC}" type="datetimeFigureOut">
               <a:rPr lang="en-AU" smtClean="0"/>
-              <a:t>14/9/22</a:t>
+              <a:t>15/9/22</a:t>
             </a:fld>
             <a:endParaRPr lang="en-AU"/>
           </a:p>
@@ -2717,7 +2723,7 @@
           <a:p>
             <a:fld id="{B540E1C3-36CE-42FB-8D35-9E01D658BDEC}" type="datetimeFigureOut">
               <a:rPr lang="en-AU" smtClean="0"/>
-              <a:t>14/9/22</a:t>
+              <a:t>15/9/22</a:t>
             </a:fld>
             <a:endParaRPr lang="en-AU"/>
           </a:p>
@@ -2960,7 +2966,7 @@
           <a:p>
             <a:fld id="{B540E1C3-36CE-42FB-8D35-9E01D658BDEC}" type="datetimeFigureOut">
               <a:rPr lang="en-AU" smtClean="0"/>
-              <a:t>14/9/22</a:t>
+              <a:t>15/9/22</a:t>
             </a:fld>
             <a:endParaRPr lang="en-AU"/>
           </a:p>
@@ -4041,7 +4047,7 @@
         <p:spPr/>
         <p:txBody>
           <a:bodyPr>
-            <a:normAutofit fontScale="77500" lnSpcReduction="20000"/>
+            <a:normAutofit fontScale="70000" lnSpcReduction="20000"/>
           </a:bodyPr>
           <a:lstStyle/>
           <a:p>
@@ -4051,7 +4057,7 @@
             </a:pPr>
             <a:r>
               <a:rPr lang="en-US" dirty="0"/>
-              <a:t>Get routes’ trips updates from database. Filter to the portion on the segment only</a:t>
+              <a:t>Get routes’ trips updates from database. Filter to the stops on the segment only</a:t>
             </a:r>
           </a:p>
           <a:p>
@@ -4085,7 +4091,7 @@
             </a:pPr>
             <a:r>
               <a:rPr lang="en-US" dirty="0"/>
-              <a:t>Calculate the travel time between each pair of stops on the trip. For error detection (lots of errors) and further analysis options</a:t>
+              <a:t>Calculate the travel time between each pair of stops on the trip. For error detection (lots of errors) and further analysis options such as average speed</a:t>
             </a:r>
           </a:p>
           <a:p>
@@ -4119,7 +4125,7 @@
             </a:pPr>
             <a:r>
               <a:rPr lang="en-US" dirty="0"/>
-              <a:t>Calculate the average travel time of all trips per time aggregate across the entire period. For example, between 7am and 7:15am across March 2022</a:t>
+              <a:t>Calculate the average travel time of all trips per time aggregate across the entire period, the basis of aggregation is the trip start time (the arrival time of the first stop on the segment). For example, all trips that start between 7am and 7:15am across March 2022</a:t>
             </a:r>
             <a:endParaRPr lang="en-AU" dirty="0"/>
           </a:p>
@@ -4423,7 +4429,7 @@
                 <a:effectLst/>
                 <a:latin typeface="Calibri" panose="020F0502020204030204" pitchFamily="34" charset="0"/>
               </a:rPr>
-              <a:t>A stop's arrival time is earlier than previous stops and the timestamp is older</a:t>
+              <a:t>A stop's arrival time is earlier than previous stops and the timestamp is earlier</a:t>
             </a:r>
           </a:p>
           <a:p>
@@ -4622,6 +4628,7 @@
           <a:bodyPr/>
           <a:lstStyle/>
           <a:p>
+            <a:pPr algn="ctr"/>
             <a:r>
               <a:rPr lang="en-AU" dirty="0"/>
               <a:t>Sudden large delay</a:t>
@@ -4712,7 +4719,7 @@
             </a:lvl1pPr>
           </a:lstStyle>
           <a:p>
-            <a:pPr fontAlgn="ctr">
+            <a:pPr algn="ctr" fontAlgn="ctr">
               <a:spcAft>
                 <a:spcPts val="0"/>
               </a:spcAft>
@@ -4811,6 +4818,7 @@
           <a:bodyPr/>
           <a:lstStyle/>
           <a:p>
+            <a:pPr algn="ctr"/>
             <a:r>
               <a:rPr lang="en-AU" dirty="0"/>
               <a:t>Stop's arrival time is earlier than previous stops and the timestamp is older</a:t>
@@ -4901,7 +4909,7 @@
             </a:lvl1pPr>
           </a:lstStyle>
           <a:p>
-            <a:pPr rtl="0" fontAlgn="ctr">
+            <a:pPr algn="ctr" rtl="0" fontAlgn="ctr">
               <a:spcBef>
                 <a:spcPts val="0"/>
               </a:spcBef>
@@ -5005,6 +5013,7 @@
           </a:bodyPr>
           <a:lstStyle/>
           <a:p>
+            <a:pPr algn="ctr"/>
             <a:r>
               <a:rPr lang="en-AU" sz="4900" dirty="0"/>
               <a:t>Two consecutive stops have identical arrival times but with different timestamps</a:t>
@@ -5096,7 +5105,7 @@
             </a:lvl1pPr>
           </a:lstStyle>
           <a:p>
-            <a:pPr rtl="0" fontAlgn="ctr">
+            <a:pPr algn="ctr" rtl="0" fontAlgn="ctr">
               <a:spcBef>
                 <a:spcPts val="0"/>
               </a:spcBef>
@@ -5303,10 +5312,10 @@
       </p:sp>
       <p:pic>
         <p:nvPicPr>
-          <p:cNvPr id="16" name="Picture 15" descr="Chart, scatter chart&#10;&#10;Description automatically generated">
-            <a:extLst>
-              <a:ext uri="{FF2B5EF4-FFF2-40B4-BE49-F238E27FC236}">
-                <a16:creationId xmlns:a16="http://schemas.microsoft.com/office/drawing/2014/main" id="{E36D79F2-C15D-3306-12A7-280B234B64D6}"/>
+          <p:cNvPr id="20" name="Picture 19" descr="Chart, scatter chart&#10;&#10;Description automatically generated">
+            <a:extLst>
+              <a:ext uri="{FF2B5EF4-FFF2-40B4-BE49-F238E27FC236}">
+                <a16:creationId xmlns:a16="http://schemas.microsoft.com/office/drawing/2014/main" id="{D7397CBC-0790-5806-A070-9CF1B88E9FE2}"/>
               </a:ext>
             </a:extLst>
           </p:cNvPr>
@@ -5317,42 +5326,6 @@
         </p:nvPicPr>
         <p:blipFill>
           <a:blip r:embed="rId2">
-            <a:extLst>
-              <a:ext uri="{28A0092B-C50C-407E-A947-70E740481C1C}">
-                <a14:useLocalDpi xmlns:a14="http://schemas.microsoft.com/office/drawing/2010/main" val="0"/>
-              </a:ext>
-            </a:extLst>
-          </a:blip>
-          <a:stretch>
-            <a:fillRect/>
-          </a:stretch>
-        </p:blipFill>
-        <p:spPr>
-          <a:xfrm>
-            <a:off x="6410148" y="1371313"/>
-            <a:ext cx="5347743" cy="4115374"/>
-          </a:xfrm>
-          <a:prstGeom prst="rect">
-            <a:avLst/>
-          </a:prstGeom>
-        </p:spPr>
-      </p:pic>
-      <p:pic>
-        <p:nvPicPr>
-          <p:cNvPr id="20" name="Picture 19" descr="Chart, scatter chart&#10;&#10;Description automatically generated">
-            <a:extLst>
-              <a:ext uri="{FF2B5EF4-FFF2-40B4-BE49-F238E27FC236}">
-                <a16:creationId xmlns:a16="http://schemas.microsoft.com/office/drawing/2014/main" id="{D7397CBC-0790-5806-A070-9CF1B88E9FE2}"/>
-              </a:ext>
-            </a:extLst>
-          </p:cNvPr>
-          <p:cNvPicPr>
-            <a:picLocks noChangeAspect="1"/>
-          </p:cNvPicPr>
-          <p:nvPr/>
-        </p:nvPicPr>
-        <p:blipFill>
-          <a:blip r:embed="rId3">
             <a:extLst>
               <a:ext uri="{28A0092B-C50C-407E-A947-70E740481C1C}">
                 <a14:useLocalDpi xmlns:a14="http://schemas.microsoft.com/office/drawing/2010/main" val="0"/>
@@ -5367,6 +5340,42 @@
           <a:xfrm>
             <a:off x="180433" y="1371313"/>
             <a:ext cx="5791200" cy="4115374"/>
+          </a:xfrm>
+          <a:prstGeom prst="rect">
+            <a:avLst/>
+          </a:prstGeom>
+        </p:spPr>
+      </p:pic>
+      <p:pic>
+        <p:nvPicPr>
+          <p:cNvPr id="3" name="Picture 2" descr="Chart, scatter chart&#10;&#10;Description automatically generated">
+            <a:extLst>
+              <a:ext uri="{FF2B5EF4-FFF2-40B4-BE49-F238E27FC236}">
+                <a16:creationId xmlns:a16="http://schemas.microsoft.com/office/drawing/2014/main" id="{06CFB491-FF98-0D0C-D736-7F4EF5D916E0}"/>
+              </a:ext>
+            </a:extLst>
+          </p:cNvPr>
+          <p:cNvPicPr>
+            <a:picLocks noChangeAspect="1"/>
+          </p:cNvPicPr>
+          <p:nvPr/>
+        </p:nvPicPr>
+        <p:blipFill>
+          <a:blip r:embed="rId3">
+            <a:extLst>
+              <a:ext uri="{28A0092B-C50C-407E-A947-70E740481C1C}">
+                <a14:useLocalDpi xmlns:a14="http://schemas.microsoft.com/office/drawing/2010/main" val="0"/>
+              </a:ext>
+            </a:extLst>
+          </a:blip>
+          <a:stretch>
+            <a:fillRect/>
+          </a:stretch>
+        </p:blipFill>
+        <p:spPr>
+          <a:xfrm>
+            <a:off x="6581956" y="1371313"/>
+            <a:ext cx="5429611" cy="4115374"/>
           </a:xfrm>
           <a:prstGeom prst="rect">
             <a:avLst/>
@@ -5434,10 +5443,10 @@
       </p:sp>
       <p:pic>
         <p:nvPicPr>
-          <p:cNvPr id="7" name="Picture 6" descr="Chart&#10;&#10;Description automatically generated">
-            <a:extLst>
-              <a:ext uri="{FF2B5EF4-FFF2-40B4-BE49-F238E27FC236}">
-                <a16:creationId xmlns:a16="http://schemas.microsoft.com/office/drawing/2014/main" id="{9FC6CC41-8491-4094-25F0-0206059580C7}"/>
+          <p:cNvPr id="11" name="Picture 10" descr="Chart, line chart&#10;&#10;Description automatically generated">
+            <a:extLst>
+              <a:ext uri="{FF2B5EF4-FFF2-40B4-BE49-F238E27FC236}">
+                <a16:creationId xmlns:a16="http://schemas.microsoft.com/office/drawing/2014/main" id="{079931A0-B920-C0E6-5BE3-F261AAF2B86F}"/>
               </a:ext>
             </a:extLst>
           </p:cNvPr>
@@ -5460,8 +5469,8 @@
         </p:blipFill>
         <p:spPr>
           <a:xfrm>
-            <a:off x="406511" y="1759240"/>
-            <a:ext cx="5689489" cy="4115374"/>
+            <a:off x="6331789" y="1759240"/>
+            <a:ext cx="5756695" cy="4115374"/>
           </a:xfrm>
           <a:prstGeom prst="rect">
             <a:avLst/>
@@ -5470,10 +5479,10 @@
       </p:pic>
       <p:pic>
         <p:nvPicPr>
-          <p:cNvPr id="11" name="Picture 10" descr="Chart, line chart&#10;&#10;Description automatically generated">
-            <a:extLst>
-              <a:ext uri="{FF2B5EF4-FFF2-40B4-BE49-F238E27FC236}">
-                <a16:creationId xmlns:a16="http://schemas.microsoft.com/office/drawing/2014/main" id="{079931A0-B920-C0E6-5BE3-F261AAF2B86F}"/>
+          <p:cNvPr id="6" name="Picture 5" descr="Chart, box and whisker chart&#10;&#10;Description automatically generated">
+            <a:extLst>
+              <a:ext uri="{FF2B5EF4-FFF2-40B4-BE49-F238E27FC236}">
+                <a16:creationId xmlns:a16="http://schemas.microsoft.com/office/drawing/2014/main" id="{F2B1C397-C87D-F5F2-39FA-92B4DBAEB40E}"/>
               </a:ext>
             </a:extLst>
           </p:cNvPr>
@@ -5496,8 +5505,8 @@
         </p:blipFill>
         <p:spPr>
           <a:xfrm>
-            <a:off x="6548582" y="1759240"/>
-            <a:ext cx="5126182" cy="4115374"/>
+            <a:off x="103516" y="1759240"/>
+            <a:ext cx="5643419" cy="4115374"/>
           </a:xfrm>
           <a:prstGeom prst="rect">
             <a:avLst/>
@@ -5598,7 +5607,7 @@
             </a:r>
             <a:r>
               <a:rPr lang="en-AU" sz="2800" dirty="0"/>
-              <a:t> data and GTFS/GTFS-R data to evaluate the extent of the relationship between trip times and road congestion for a given segment(s) of road – in this case, South Road. This can indicate the robustness of the bus transport infrastructure to high levels of congestion.</a:t>
+              <a:t> data and GTFS/GTFS-R data to evaluate the extent of the relationship between trip times and road congestion for a given segment(s) of road. This can indicate the robustness of the bus transport infrastructure to high levels of congestion.</a:t>
             </a:r>
           </a:p>
           <a:p>
@@ -5644,6 +5653,137 @@
           <p:cNvPr id="2" name="Title 1">
             <a:extLst>
               <a:ext uri="{FF2B5EF4-FFF2-40B4-BE49-F238E27FC236}">
+                <a16:creationId xmlns:a16="http://schemas.microsoft.com/office/drawing/2014/main" id="{D7AC7B3E-1924-3854-6497-94C485C3103B}"/>
+              </a:ext>
+            </a:extLst>
+          </p:cNvPr>
+          <p:cNvSpPr>
+            <a:spLocks noGrp="1"/>
+          </p:cNvSpPr>
+          <p:nvPr>
+            <p:ph type="title"/>
+          </p:nvPr>
+        </p:nvSpPr>
+        <p:spPr/>
+        <p:txBody>
+          <a:bodyPr/>
+          <a:lstStyle/>
+          <a:p>
+            <a:pPr algn="ctr"/>
+            <a:r>
+              <a:rPr lang="en-AU" dirty="0"/>
+              <a:t>Peaks Trip Time Plots</a:t>
+            </a:r>
+          </a:p>
+        </p:txBody>
+      </p:sp>
+      <p:pic>
+        <p:nvPicPr>
+          <p:cNvPr id="7" name="Picture 6" descr="Chart, box and whisker chart&#10;&#10;Description automatically generated">
+            <a:extLst>
+              <a:ext uri="{FF2B5EF4-FFF2-40B4-BE49-F238E27FC236}">
+                <a16:creationId xmlns:a16="http://schemas.microsoft.com/office/drawing/2014/main" id="{73709606-B716-C723-077E-704A1C161032}"/>
+              </a:ext>
+            </a:extLst>
+          </p:cNvPr>
+          <p:cNvPicPr>
+            <a:picLocks noChangeAspect="1"/>
+          </p:cNvPicPr>
+          <p:nvPr/>
+        </p:nvPicPr>
+        <p:blipFill>
+          <a:blip r:embed="rId2">
+            <a:extLst>
+              <a:ext uri="{28A0092B-C50C-407E-A947-70E740481C1C}">
+                <a14:useLocalDpi xmlns:a14="http://schemas.microsoft.com/office/drawing/2010/main" val="0"/>
+              </a:ext>
+            </a:extLst>
+          </a:blip>
+          <a:stretch>
+            <a:fillRect/>
+          </a:stretch>
+        </p:blipFill>
+        <p:spPr>
+          <a:xfrm>
+            <a:off x="73891" y="1690688"/>
+            <a:ext cx="5689600" cy="4115374"/>
+          </a:xfrm>
+          <a:prstGeom prst="rect">
+            <a:avLst/>
+          </a:prstGeom>
+        </p:spPr>
+      </p:pic>
+      <p:pic>
+        <p:nvPicPr>
+          <p:cNvPr id="11" name="Picture 10" descr="Chart, line chart&#10;&#10;Description automatically generated">
+            <a:extLst>
+              <a:ext uri="{FF2B5EF4-FFF2-40B4-BE49-F238E27FC236}">
+                <a16:creationId xmlns:a16="http://schemas.microsoft.com/office/drawing/2014/main" id="{D1140FD5-9ACF-B658-B51A-918E2BBD564C}"/>
+              </a:ext>
+            </a:extLst>
+          </p:cNvPr>
+          <p:cNvPicPr>
+            <a:picLocks noChangeAspect="1"/>
+          </p:cNvPicPr>
+          <p:nvPr/>
+        </p:nvPicPr>
+        <p:blipFill>
+          <a:blip r:embed="rId3">
+            <a:extLst>
+              <a:ext uri="{28A0092B-C50C-407E-A947-70E740481C1C}">
+                <a14:useLocalDpi xmlns:a14="http://schemas.microsoft.com/office/drawing/2010/main" val="0"/>
+              </a:ext>
+            </a:extLst>
+          </a:blip>
+          <a:stretch>
+            <a:fillRect/>
+          </a:stretch>
+        </p:blipFill>
+        <p:spPr>
+          <a:xfrm>
+            <a:off x="6096000" y="1690688"/>
+            <a:ext cx="6096000" cy="4115374"/>
+          </a:xfrm>
+          <a:prstGeom prst="rect">
+            <a:avLst/>
+          </a:prstGeom>
+        </p:spPr>
+      </p:pic>
+    </p:spTree>
+    <p:extLst>
+      <p:ext uri="{BB962C8B-B14F-4D97-AF65-F5344CB8AC3E}">
+        <p14:creationId xmlns:p14="http://schemas.microsoft.com/office/powerpoint/2010/main" val="3341852828"/>
+      </p:ext>
+    </p:extLst>
+  </p:cSld>
+  <p:clrMapOvr>
+    <a:masterClrMapping/>
+  </p:clrMapOvr>
+</p:sld>
+</file>
+
+<file path=ppt/slides/slide21.xml><?xml version="1.0" encoding="utf-8"?>
+<p:sld xmlns:a="http://schemas.openxmlformats.org/drawingml/2006/main" xmlns:r="http://schemas.openxmlformats.org/officeDocument/2006/relationships" xmlns:p="http://schemas.openxmlformats.org/presentationml/2006/main">
+  <p:cSld>
+    <p:spTree>
+      <p:nvGrpSpPr>
+        <p:cNvPr id="1" name=""/>
+        <p:cNvGrpSpPr/>
+        <p:nvPr/>
+      </p:nvGrpSpPr>
+      <p:grpSpPr>
+        <a:xfrm>
+          <a:off x="0" y="0"/>
+          <a:ext cx="0" cy="0"/>
+          <a:chOff x="0" y="0"/>
+          <a:chExt cx="0" cy="0"/>
+        </a:xfrm>
+      </p:grpSpPr>
+      <p:sp>
+        <p:nvSpPr>
+          <p:cNvPr id="2" name="Title 1">
+            <a:extLst>
+              <a:ext uri="{FF2B5EF4-FFF2-40B4-BE49-F238E27FC236}">
                 <a16:creationId xmlns:a16="http://schemas.microsoft.com/office/drawing/2014/main" id="{AB08916D-81ED-A8C0-9DC5-7131258F1853}"/>
               </a:ext>
             </a:extLst>
@@ -5751,7 +5891,7 @@
 </p:sld>
 </file>
 
-<file path=ppt/slides/slide21.xml><?xml version="1.0" encoding="utf-8"?>
+<file path=ppt/slides/slide22.xml><?xml version="1.0" encoding="utf-8"?>
 <p:sld xmlns:a="http://schemas.openxmlformats.org/drawingml/2006/main" xmlns:r="http://schemas.openxmlformats.org/officeDocument/2006/relationships" xmlns:p="http://schemas.openxmlformats.org/presentationml/2006/main">
   <p:cSld>
     <p:spTree>
@@ -5811,7 +5951,7 @@
 </p:sld>
 </file>
 
-<file path=ppt/slides/slide22.xml><?xml version="1.0" encoding="utf-8"?>
+<file path=ppt/slides/slide23.xml><?xml version="1.0" encoding="utf-8"?>
 <p:sld xmlns:a="http://schemas.openxmlformats.org/drawingml/2006/main" xmlns:r="http://schemas.openxmlformats.org/officeDocument/2006/relationships" xmlns:p="http://schemas.openxmlformats.org/presentationml/2006/main">
   <p:cSld>
     <p:spTree>
@@ -5871,7 +6011,7 @@
 </p:sld>
 </file>
 
-<file path=ppt/slides/slide23.xml><?xml version="1.0" encoding="utf-8"?>
+<file path=ppt/slides/slide24.xml><?xml version="1.0" encoding="utf-8"?>
 <p:sld xmlns:a="http://schemas.openxmlformats.org/drawingml/2006/main" xmlns:r="http://schemas.openxmlformats.org/officeDocument/2006/relationships" xmlns:p="http://schemas.openxmlformats.org/presentationml/2006/main">
   <p:cSld>
     <p:spTree>
@@ -5931,7 +6071,7 @@
 </p:sld>
 </file>
 
-<file path=ppt/slides/slide24.xml><?xml version="1.0" encoding="utf-8"?>
+<file path=ppt/slides/slide25.xml><?xml version="1.0" encoding="utf-8"?>
 <p:sld xmlns:a="http://schemas.openxmlformats.org/drawingml/2006/main" xmlns:r="http://schemas.openxmlformats.org/officeDocument/2006/relationships" xmlns:p="http://schemas.openxmlformats.org/presentationml/2006/main">
   <p:cSld>
     <p:spTree>
@@ -6113,128 +6253,6 @@
 </p:sld>
 </file>
 
-<file path=ppt/slides/slide25.xml><?xml version="1.0" encoding="utf-8"?>
-<p:sld xmlns:a="http://schemas.openxmlformats.org/drawingml/2006/main" xmlns:r="http://schemas.openxmlformats.org/officeDocument/2006/relationships" xmlns:p="http://schemas.openxmlformats.org/presentationml/2006/main">
-  <p:cSld>
-    <p:spTree>
-      <p:nvGrpSpPr>
-        <p:cNvPr id="1" name=""/>
-        <p:cNvGrpSpPr/>
-        <p:nvPr/>
-      </p:nvGrpSpPr>
-      <p:grpSpPr>
-        <a:xfrm>
-          <a:off x="0" y="0"/>
-          <a:ext cx="0" cy="0"/>
-          <a:chOff x="0" y="0"/>
-          <a:chExt cx="0" cy="0"/>
-        </a:xfrm>
-      </p:grpSpPr>
-      <p:sp>
-        <p:nvSpPr>
-          <p:cNvPr id="2" name="Title 1">
-            <a:extLst>
-              <a:ext uri="{FF2B5EF4-FFF2-40B4-BE49-F238E27FC236}">
-                <a16:creationId xmlns:a16="http://schemas.microsoft.com/office/drawing/2014/main" id="{7235B78A-B82E-6711-D397-46313139F9B9}"/>
-              </a:ext>
-            </a:extLst>
-          </p:cNvPr>
-          <p:cNvSpPr>
-            <a:spLocks noGrp="1"/>
-          </p:cNvSpPr>
-          <p:nvPr>
-            <p:ph type="title"/>
-          </p:nvPr>
-        </p:nvSpPr>
-        <p:spPr/>
-        <p:txBody>
-          <a:bodyPr/>
-          <a:lstStyle/>
-          <a:p>
-            <a:pPr algn="ctr"/>
-            <a:r>
-              <a:rPr lang="en-US" dirty="0"/>
-              <a:t>Comparison Between Bus Travel Time and Congestion</a:t>
-            </a:r>
-            <a:endParaRPr lang="en-AU" dirty="0"/>
-          </a:p>
-        </p:txBody>
-      </p:sp>
-      <p:sp>
-        <p:nvSpPr>
-          <p:cNvPr id="3" name="Content Placeholder 2">
-            <a:extLst>
-              <a:ext uri="{FF2B5EF4-FFF2-40B4-BE49-F238E27FC236}">
-                <a16:creationId xmlns:a16="http://schemas.microsoft.com/office/drawing/2014/main" id="{9F85EAAF-A857-63F2-726A-23962246687C}"/>
-              </a:ext>
-            </a:extLst>
-          </p:cNvPr>
-          <p:cNvSpPr>
-            <a:spLocks noGrp="1"/>
-          </p:cNvSpPr>
-          <p:nvPr>
-            <p:ph idx="1"/>
-          </p:nvPr>
-        </p:nvSpPr>
-        <p:spPr/>
-        <p:txBody>
-          <a:bodyPr/>
-          <a:lstStyle/>
-          <a:p>
-            <a:pPr marL="0" indent="0">
-              <a:buNone/>
-            </a:pPr>
-            <a:endParaRPr lang="en-US" dirty="0"/>
-          </a:p>
-          <a:p>
-            <a:pPr marL="0" indent="0">
-              <a:buNone/>
-            </a:pPr>
-            <a:r>
-              <a:rPr lang="en-US" dirty="0"/>
-              <a:t>The relationship between road congestion and bus travel times will be determined by </a:t>
-            </a:r>
-            <a:r>
-              <a:rPr lang="en-US" dirty="0" err="1"/>
-              <a:t>analysing</a:t>
-            </a:r>
-            <a:r>
-              <a:rPr lang="en-US" dirty="0"/>
-              <a:t> the variation in bus travel times compared with the variation in congestion levels. </a:t>
-            </a:r>
-            <a:r>
-              <a:rPr lang="en-US" dirty="0" err="1"/>
-              <a:t>Visualisation</a:t>
-            </a:r>
-            <a:r>
-              <a:rPr lang="en-US" dirty="0"/>
-              <a:t> will be used to examine the relationship per time aggregate. Specific aspects may be highlighted according to the dimensions desired, for example separate </a:t>
-            </a:r>
-            <a:r>
-              <a:rPr lang="en-US" dirty="0" err="1"/>
-              <a:t>visualisations</a:t>
-            </a:r>
-            <a:r>
-              <a:rPr lang="en-US" dirty="0"/>
-              <a:t> can be constructed according to the direction towards or away from the city, as well the relationship during morning and evening peak hours.</a:t>
-            </a:r>
-            <a:endParaRPr lang="en-AU" dirty="0"/>
-          </a:p>
-        </p:txBody>
-      </p:sp>
-    </p:spTree>
-    <p:extLst>
-      <p:ext uri="{BB962C8B-B14F-4D97-AF65-F5344CB8AC3E}">
-        <p14:creationId xmlns:p14="http://schemas.microsoft.com/office/powerpoint/2010/main" val="3418943977"/>
-      </p:ext>
-    </p:extLst>
-  </p:cSld>
-  <p:clrMapOvr>
-    <a:masterClrMapping/>
-  </p:clrMapOvr>
-</p:sld>
-</file>
-
 <file path=ppt/slides/slide26.xml><?xml version="1.0" encoding="utf-8"?>
 <p:sld xmlns:a="http://schemas.openxmlformats.org/drawingml/2006/main" xmlns:r="http://schemas.openxmlformats.org/officeDocument/2006/relationships" xmlns:p="http://schemas.openxmlformats.org/presentationml/2006/main">
   <p:cSld>
@@ -6257,7 +6275,7 @@
           <p:cNvPr id="2" name="Title 1">
             <a:extLst>
               <a:ext uri="{FF2B5EF4-FFF2-40B4-BE49-F238E27FC236}">
-                <a16:creationId xmlns:a16="http://schemas.microsoft.com/office/drawing/2014/main" id="{D8926821-8BBF-E647-F6A8-EE35B280FCFE}"/>
+                <a16:creationId xmlns:a16="http://schemas.microsoft.com/office/drawing/2014/main" id="{7235B78A-B82E-6711-D397-46313139F9B9}"/>
               </a:ext>
             </a:extLst>
           </p:cNvPr>
@@ -6268,64 +6286,86 @@
             <p:ph type="title"/>
           </p:nvPr>
         </p:nvSpPr>
-        <p:spPr>
-          <a:xfrm>
-            <a:off x="838199" y="0"/>
-            <a:ext cx="10515600" cy="1325563"/>
-          </a:xfrm>
-        </p:spPr>
+        <p:spPr/>
         <p:txBody>
           <a:bodyPr/>
           <a:lstStyle/>
           <a:p>
             <a:pPr algn="ctr"/>
             <a:r>
-              <a:rPr lang="en-AU" dirty="0"/>
-              <a:t>Time vs Sites (15 mins)</a:t>
-            </a:r>
-          </a:p>
-        </p:txBody>
-      </p:sp>
-      <p:pic>
-        <p:nvPicPr>
-          <p:cNvPr id="7" name="Picture 6" descr="Chart&#10;&#10;Description automatically generated">
-            <a:extLst>
-              <a:ext uri="{FF2B5EF4-FFF2-40B4-BE49-F238E27FC236}">
-                <a16:creationId xmlns:a16="http://schemas.microsoft.com/office/drawing/2014/main" id="{303B8F0E-07AB-029C-D874-2D3870CBD601}"/>
-              </a:ext>
-            </a:extLst>
-          </p:cNvPr>
-          <p:cNvPicPr>
-            <a:picLocks noChangeAspect="1"/>
-          </p:cNvPicPr>
-          <p:nvPr/>
-        </p:nvPicPr>
-        <p:blipFill>
-          <a:blip r:embed="rId2">
-            <a:extLst>
-              <a:ext uri="{28A0092B-C50C-407E-A947-70E740481C1C}">
-                <a14:useLocalDpi xmlns:a14="http://schemas.microsoft.com/office/drawing/2010/main" val="0"/>
-              </a:ext>
-            </a:extLst>
-          </a:blip>
-          <a:stretch>
-            <a:fillRect/>
-          </a:stretch>
-        </p:blipFill>
-        <p:spPr>
-          <a:xfrm>
-            <a:off x="1602509" y="1311749"/>
-            <a:ext cx="8986982" cy="5546251"/>
-          </a:xfrm>
-          <a:prstGeom prst="rect">
-            <a:avLst/>
-          </a:prstGeom>
-        </p:spPr>
-      </p:pic>
+              <a:rPr lang="en-US" dirty="0"/>
+              <a:t>Comparison Between Bus Travel Time and Congestion</a:t>
+            </a:r>
+            <a:endParaRPr lang="en-AU" dirty="0"/>
+          </a:p>
+        </p:txBody>
+      </p:sp>
+      <p:sp>
+        <p:nvSpPr>
+          <p:cNvPr id="3" name="Content Placeholder 2">
+            <a:extLst>
+              <a:ext uri="{FF2B5EF4-FFF2-40B4-BE49-F238E27FC236}">
+                <a16:creationId xmlns:a16="http://schemas.microsoft.com/office/drawing/2014/main" id="{9F85EAAF-A857-63F2-726A-23962246687C}"/>
+              </a:ext>
+            </a:extLst>
+          </p:cNvPr>
+          <p:cNvSpPr>
+            <a:spLocks noGrp="1"/>
+          </p:cNvSpPr>
+          <p:nvPr>
+            <p:ph idx="1"/>
+          </p:nvPr>
+        </p:nvSpPr>
+        <p:spPr/>
+        <p:txBody>
+          <a:bodyPr/>
+          <a:lstStyle/>
+          <a:p>
+            <a:pPr marL="0" indent="0">
+              <a:buNone/>
+            </a:pPr>
+            <a:endParaRPr lang="en-US" dirty="0"/>
+          </a:p>
+          <a:p>
+            <a:pPr marL="0" indent="0">
+              <a:buNone/>
+            </a:pPr>
+            <a:r>
+              <a:rPr lang="en-US" dirty="0"/>
+              <a:t>The relationship between road congestion and bus travel times will be determined by </a:t>
+            </a:r>
+            <a:r>
+              <a:rPr lang="en-US" dirty="0" err="1"/>
+              <a:t>analysing</a:t>
+            </a:r>
+            <a:r>
+              <a:rPr lang="en-US" dirty="0"/>
+              <a:t> the variation in bus travel times compared with the variation in congestion levels. </a:t>
+            </a:r>
+            <a:r>
+              <a:rPr lang="en-US" dirty="0" err="1"/>
+              <a:t>Visualisation</a:t>
+            </a:r>
+            <a:r>
+              <a:rPr lang="en-US" dirty="0"/>
+              <a:t> will be used to examine the relationship per time aggregate. Specific aspects may be highlighted according to the dimensions desired, for example separate </a:t>
+            </a:r>
+            <a:r>
+              <a:rPr lang="en-US" dirty="0" err="1"/>
+              <a:t>visualisations</a:t>
+            </a:r>
+            <a:r>
+              <a:rPr lang="en-US" dirty="0"/>
+              <a:t> can be constructed according to the direction towards or away from the city, as well the relationship during morning and evening peak hours.</a:t>
+            </a:r>
+            <a:endParaRPr lang="en-AU" dirty="0"/>
+          </a:p>
+        </p:txBody>
+      </p:sp>
     </p:spTree>
     <p:extLst>
       <p:ext uri="{BB962C8B-B14F-4D97-AF65-F5344CB8AC3E}">
-        <p14:creationId xmlns:p14="http://schemas.microsoft.com/office/powerpoint/2010/main" val="3067601701"/>
+        <p14:creationId xmlns:p14="http://schemas.microsoft.com/office/powerpoint/2010/main" val="3418943977"/>
       </p:ext>
     </p:extLst>
   </p:cSld>
@@ -6357,7 +6397,7 @@
           <p:cNvPr id="2" name="Title 1">
             <a:extLst>
               <a:ext uri="{FF2B5EF4-FFF2-40B4-BE49-F238E27FC236}">
-                <a16:creationId xmlns:a16="http://schemas.microsoft.com/office/drawing/2014/main" id="{9465763C-FD0F-A2AA-8A87-4E885965DE2C}"/>
+                <a16:creationId xmlns:a16="http://schemas.microsoft.com/office/drawing/2014/main" id="{D8926821-8BBF-E647-F6A8-EE35B280FCFE}"/>
               </a:ext>
             </a:extLst>
           </p:cNvPr>
@@ -6368,7 +6408,12 @@
             <p:ph type="title"/>
           </p:nvPr>
         </p:nvSpPr>
-        <p:spPr/>
+        <p:spPr>
+          <a:xfrm>
+            <a:off x="838199" y="0"/>
+            <a:ext cx="10515600" cy="1325563"/>
+          </a:xfrm>
+        </p:spPr>
         <p:txBody>
           <a:bodyPr/>
           <a:lstStyle/>
@@ -6376,17 +6421,17 @@
             <a:pPr algn="ctr"/>
             <a:r>
               <a:rPr lang="en-AU" dirty="0"/>
-              <a:t>Time vs Sites Scatter (15 mins)</a:t>
+              <a:t>Time vs Sites (15 mins)</a:t>
             </a:r>
           </a:p>
         </p:txBody>
       </p:sp>
       <p:pic>
         <p:nvPicPr>
-          <p:cNvPr id="7" name="Picture 6" descr="Chart, scatter chart&#10;&#10;Description automatically generated">
-            <a:extLst>
-              <a:ext uri="{FF2B5EF4-FFF2-40B4-BE49-F238E27FC236}">
-                <a16:creationId xmlns:a16="http://schemas.microsoft.com/office/drawing/2014/main" id="{AFF4625B-6FFF-A2FD-7159-9D6C08473600}"/>
+          <p:cNvPr id="7" name="Picture 6" descr="Chart&#10;&#10;Description automatically generated">
+            <a:extLst>
+              <a:ext uri="{FF2B5EF4-FFF2-40B4-BE49-F238E27FC236}">
+                <a16:creationId xmlns:a16="http://schemas.microsoft.com/office/drawing/2014/main" id="{303B8F0E-07AB-029C-D874-2D3870CBD601}"/>
               </a:ext>
             </a:extLst>
           </p:cNvPr>
@@ -6409,8 +6454,38 @@
         </p:blipFill>
         <p:spPr>
           <a:xfrm>
-            <a:off x="2172955" y="1650718"/>
-            <a:ext cx="7846089" cy="4842157"/>
+            <a:off x="1602509" y="1311749"/>
+            <a:ext cx="8986982" cy="5546251"/>
+          </a:xfrm>
+          <a:prstGeom prst="rect">
+            <a:avLst/>
+          </a:prstGeom>
+        </p:spPr>
+      </p:pic>
+      <p:pic>
+        <p:nvPicPr>
+          <p:cNvPr id="4" name="Picture 3">
+            <a:extLst>
+              <a:ext uri="{FF2B5EF4-FFF2-40B4-BE49-F238E27FC236}">
+                <a16:creationId xmlns:a16="http://schemas.microsoft.com/office/drawing/2014/main" id="{8F03D718-FD59-5766-66CE-28DB3ACFC636}"/>
+              </a:ext>
+            </a:extLst>
+          </p:cNvPr>
+          <p:cNvPicPr>
+            <a:picLocks noChangeAspect="1"/>
+          </p:cNvPicPr>
+          <p:nvPr/>
+        </p:nvPicPr>
+        <p:blipFill>
+          <a:blip r:embed="rId3"/>
+          <a:stretch>
+            <a:fillRect/>
+          </a:stretch>
+        </p:blipFill>
+        <p:spPr>
+          <a:xfrm>
+            <a:off x="3304784" y="940939"/>
+            <a:ext cx="5582429" cy="228632"/>
           </a:xfrm>
           <a:prstGeom prst="rect">
             <a:avLst/>
@@ -6420,7 +6495,7 @@
     </p:spTree>
     <p:extLst>
       <p:ext uri="{BB962C8B-B14F-4D97-AF65-F5344CB8AC3E}">
-        <p14:creationId xmlns:p14="http://schemas.microsoft.com/office/powerpoint/2010/main" val="3845385295"/>
+        <p14:creationId xmlns:p14="http://schemas.microsoft.com/office/powerpoint/2010/main" val="3067601701"/>
       </p:ext>
     </p:extLst>
   </p:cSld>
@@ -6452,7 +6527,7 @@
           <p:cNvPr id="2" name="Title 1">
             <a:extLst>
               <a:ext uri="{FF2B5EF4-FFF2-40B4-BE49-F238E27FC236}">
-                <a16:creationId xmlns:a16="http://schemas.microsoft.com/office/drawing/2014/main" id="{ADD5985E-7174-55E2-9ADB-76BCFFA1CC77}"/>
+                <a16:creationId xmlns:a16="http://schemas.microsoft.com/office/drawing/2014/main" id="{9465763C-FD0F-A2AA-8A87-4E885965DE2C}"/>
               </a:ext>
             </a:extLst>
           </p:cNvPr>
@@ -6463,7 +6538,12 @@
             <p:ph type="title"/>
           </p:nvPr>
         </p:nvSpPr>
-        <p:spPr/>
+        <p:spPr>
+          <a:xfrm>
+            <a:off x="838199" y="117617"/>
+            <a:ext cx="10515600" cy="1325563"/>
+          </a:xfrm>
+        </p:spPr>
         <p:txBody>
           <a:bodyPr/>
           <a:lstStyle/>
@@ -6471,17 +6551,17 @@
             <a:pPr algn="ctr"/>
             <a:r>
               <a:rPr lang="en-AU" dirty="0"/>
-              <a:t>Time vs Links Travel Time (30 mins)</a:t>
+              <a:t>Time vs Sites Scatter (15 mins)</a:t>
             </a:r>
           </a:p>
         </p:txBody>
       </p:sp>
       <p:pic>
         <p:nvPicPr>
-          <p:cNvPr id="5" name="Picture 4" descr="Chart&#10;&#10;Description automatically generated">
-            <a:extLst>
-              <a:ext uri="{FF2B5EF4-FFF2-40B4-BE49-F238E27FC236}">
-                <a16:creationId xmlns:a16="http://schemas.microsoft.com/office/drawing/2014/main" id="{CC19EB8F-4512-DA3F-65B6-6F2D27D30CB8}"/>
+          <p:cNvPr id="7" name="Picture 6" descr="Chart, scatter chart&#10;&#10;Description automatically generated">
+            <a:extLst>
+              <a:ext uri="{FF2B5EF4-FFF2-40B4-BE49-F238E27FC236}">
+                <a16:creationId xmlns:a16="http://schemas.microsoft.com/office/drawing/2014/main" id="{AFF4625B-6FFF-A2FD-7159-9D6C08473600}"/>
               </a:ext>
             </a:extLst>
           </p:cNvPr>
@@ -6504,8 +6584,38 @@
         </p:blipFill>
         <p:spPr>
           <a:xfrm>
-            <a:off x="1754909" y="1389784"/>
-            <a:ext cx="8682181" cy="5358145"/>
+            <a:off x="2172955" y="1650718"/>
+            <a:ext cx="7846089" cy="4842157"/>
+          </a:xfrm>
+          <a:prstGeom prst="rect">
+            <a:avLst/>
+          </a:prstGeom>
+        </p:spPr>
+      </p:pic>
+      <p:pic>
+        <p:nvPicPr>
+          <p:cNvPr id="4" name="Picture 3">
+            <a:extLst>
+              <a:ext uri="{FF2B5EF4-FFF2-40B4-BE49-F238E27FC236}">
+                <a16:creationId xmlns:a16="http://schemas.microsoft.com/office/drawing/2014/main" id="{6AC17119-7DDC-4B26-C44B-2A8E2B111321}"/>
+              </a:ext>
+            </a:extLst>
+          </p:cNvPr>
+          <p:cNvPicPr>
+            <a:picLocks noChangeAspect="1"/>
+          </p:cNvPicPr>
+          <p:nvPr/>
+        </p:nvPicPr>
+        <p:blipFill>
+          <a:blip r:embed="rId3"/>
+          <a:stretch>
+            <a:fillRect/>
+          </a:stretch>
+        </p:blipFill>
+        <p:spPr>
+          <a:xfrm>
+            <a:off x="3051053" y="1098246"/>
+            <a:ext cx="5868219" cy="209579"/>
           </a:xfrm>
           <a:prstGeom prst="rect">
             <a:avLst/>
@@ -6515,7 +6625,7 @@
     </p:spTree>
     <p:extLst>
       <p:ext uri="{BB962C8B-B14F-4D97-AF65-F5344CB8AC3E}">
-        <p14:creationId xmlns:p14="http://schemas.microsoft.com/office/powerpoint/2010/main" val="1665953866"/>
+        <p14:creationId xmlns:p14="http://schemas.microsoft.com/office/powerpoint/2010/main" val="3845385295"/>
       </p:ext>
     </p:extLst>
   </p:cSld>
@@ -6558,7 +6668,12 @@
             <p:ph type="title"/>
           </p:nvPr>
         </p:nvSpPr>
-        <p:spPr/>
+        <p:spPr>
+          <a:xfrm>
+            <a:off x="838199" y="64221"/>
+            <a:ext cx="10515600" cy="1325563"/>
+          </a:xfrm>
+        </p:spPr>
         <p:txBody>
           <a:bodyPr/>
           <a:lstStyle/>
@@ -6566,17 +6681,17 @@
             <a:pPr algn="ctr"/>
             <a:r>
               <a:rPr lang="en-AU" dirty="0"/>
-              <a:t>Time vs Links Delay (30 mins)</a:t>
+              <a:t>Time vs Links Travel Time (30 mins)</a:t>
             </a:r>
           </a:p>
         </p:txBody>
       </p:sp>
       <p:pic>
         <p:nvPicPr>
-          <p:cNvPr id="4" name="Picture 3" descr="Chart&#10;&#10;Description automatically generated">
-            <a:extLst>
-              <a:ext uri="{FF2B5EF4-FFF2-40B4-BE49-F238E27FC236}">
-                <a16:creationId xmlns:a16="http://schemas.microsoft.com/office/drawing/2014/main" id="{41C2B965-74D7-BDC8-4300-BF69D5464543}"/>
+          <p:cNvPr id="5" name="Picture 4" descr="Chart&#10;&#10;Description automatically generated">
+            <a:extLst>
+              <a:ext uri="{FF2B5EF4-FFF2-40B4-BE49-F238E27FC236}">
+                <a16:creationId xmlns:a16="http://schemas.microsoft.com/office/drawing/2014/main" id="{CC19EB8F-4512-DA3F-65B6-6F2D27D30CB8}"/>
               </a:ext>
             </a:extLst>
           </p:cNvPr>
@@ -6599,8 +6714,38 @@
         </p:blipFill>
         <p:spPr>
           <a:xfrm>
-            <a:off x="1782618" y="1317567"/>
-            <a:ext cx="8626764" cy="5323945"/>
+            <a:off x="1754909" y="1389784"/>
+            <a:ext cx="8682181" cy="5358145"/>
+          </a:xfrm>
+          <a:prstGeom prst="rect">
+            <a:avLst/>
+          </a:prstGeom>
+        </p:spPr>
+      </p:pic>
+      <p:pic>
+        <p:nvPicPr>
+          <p:cNvPr id="4" name="Picture 3">
+            <a:extLst>
+              <a:ext uri="{FF2B5EF4-FFF2-40B4-BE49-F238E27FC236}">
+                <a16:creationId xmlns:a16="http://schemas.microsoft.com/office/drawing/2014/main" id="{4EBDE0A4-AA48-6ABF-36D0-FD712C84C213}"/>
+              </a:ext>
+            </a:extLst>
+          </p:cNvPr>
+          <p:cNvPicPr>
+            <a:picLocks noChangeAspect="1"/>
+          </p:cNvPicPr>
+          <p:nvPr/>
+        </p:nvPicPr>
+        <p:blipFill>
+          <a:blip r:embed="rId3"/>
+          <a:stretch>
+            <a:fillRect/>
+          </a:stretch>
+        </p:blipFill>
+        <p:spPr>
+          <a:xfrm>
+            <a:off x="2532449" y="1098517"/>
+            <a:ext cx="6868484" cy="238158"/>
           </a:xfrm>
           <a:prstGeom prst="rect">
             <a:avLst/>
@@ -6610,7 +6755,7 @@
     </p:spTree>
     <p:extLst>
       <p:ext uri="{BB962C8B-B14F-4D97-AF65-F5344CB8AC3E}">
-        <p14:creationId xmlns:p14="http://schemas.microsoft.com/office/powerpoint/2010/main" val="1373272122"/>
+        <p14:creationId xmlns:p14="http://schemas.microsoft.com/office/powerpoint/2010/main" val="1665953866"/>
       </p:ext>
     </p:extLst>
   </p:cSld>
@@ -6695,14 +6840,14 @@
               <a:buAutoNum type="arabicPeriod"/>
             </a:pPr>
             <a:r>
-              <a:rPr lang="en-AU" sz="2000" dirty="0"/>
+              <a:rPr lang="en-AU" sz="2000" b="1" dirty="0"/>
               <a:t>DIT </a:t>
             </a:r>
             <a:r>
-              <a:rPr lang="en-AU" sz="2000" dirty="0" err="1"/>
+              <a:rPr lang="en-AU" sz="2000" b="1" dirty="0" err="1"/>
               <a:t>AddInsights</a:t>
             </a:r>
-            <a:endParaRPr lang="en-AU" sz="2000" dirty="0"/>
+            <a:endParaRPr lang="en-AU" sz="2000" b="1" dirty="0"/>
           </a:p>
           <a:p>
             <a:pPr marL="0" indent="0">
@@ -6741,7 +6886,7 @@
               <a:buAutoNum type="arabicPeriod" startAt="2"/>
             </a:pPr>
             <a:r>
-              <a:rPr lang="en-US" sz="2000" dirty="0"/>
+              <a:rPr lang="en-US" sz="2000" b="1" dirty="0"/>
               <a:t>GTFS</a:t>
             </a:r>
           </a:p>
@@ -6766,7 +6911,7 @@
               <a:buAutoNum type="arabicPeriod" startAt="3"/>
             </a:pPr>
             <a:r>
-              <a:rPr lang="en-US" sz="2000" dirty="0"/>
+              <a:rPr lang="en-US" sz="2000" b="1" dirty="0"/>
               <a:t>GTFS-R</a:t>
             </a:r>
           </a:p>
@@ -6871,6 +7016,101 @@
             <a:pPr algn="ctr"/>
             <a:r>
               <a:rPr lang="en-AU" dirty="0"/>
+              <a:t>Time vs Links Delay (30 mins)</a:t>
+            </a:r>
+          </a:p>
+        </p:txBody>
+      </p:sp>
+      <p:pic>
+        <p:nvPicPr>
+          <p:cNvPr id="4" name="Picture 3" descr="Chart&#10;&#10;Description automatically generated">
+            <a:extLst>
+              <a:ext uri="{FF2B5EF4-FFF2-40B4-BE49-F238E27FC236}">
+                <a16:creationId xmlns:a16="http://schemas.microsoft.com/office/drawing/2014/main" id="{41C2B965-74D7-BDC8-4300-BF69D5464543}"/>
+              </a:ext>
+            </a:extLst>
+          </p:cNvPr>
+          <p:cNvPicPr>
+            <a:picLocks noChangeAspect="1"/>
+          </p:cNvPicPr>
+          <p:nvPr/>
+        </p:nvPicPr>
+        <p:blipFill>
+          <a:blip r:embed="rId2">
+            <a:extLst>
+              <a:ext uri="{28A0092B-C50C-407E-A947-70E740481C1C}">
+                <a14:useLocalDpi xmlns:a14="http://schemas.microsoft.com/office/drawing/2010/main" val="0"/>
+              </a:ext>
+            </a:extLst>
+          </a:blip>
+          <a:stretch>
+            <a:fillRect/>
+          </a:stretch>
+        </p:blipFill>
+        <p:spPr>
+          <a:xfrm>
+            <a:off x="1782618" y="1317567"/>
+            <a:ext cx="8626764" cy="5323945"/>
+          </a:xfrm>
+          <a:prstGeom prst="rect">
+            <a:avLst/>
+          </a:prstGeom>
+        </p:spPr>
+      </p:pic>
+    </p:spTree>
+    <p:extLst>
+      <p:ext uri="{BB962C8B-B14F-4D97-AF65-F5344CB8AC3E}">
+        <p14:creationId xmlns:p14="http://schemas.microsoft.com/office/powerpoint/2010/main" val="1373272122"/>
+      </p:ext>
+    </p:extLst>
+  </p:cSld>
+  <p:clrMapOvr>
+    <a:masterClrMapping/>
+  </p:clrMapOvr>
+</p:sld>
+</file>
+
+<file path=ppt/slides/slide31.xml><?xml version="1.0" encoding="utf-8"?>
+<p:sld xmlns:a="http://schemas.openxmlformats.org/drawingml/2006/main" xmlns:r="http://schemas.openxmlformats.org/officeDocument/2006/relationships" xmlns:p="http://schemas.openxmlformats.org/presentationml/2006/main">
+  <p:cSld>
+    <p:spTree>
+      <p:nvGrpSpPr>
+        <p:cNvPr id="1" name=""/>
+        <p:cNvGrpSpPr/>
+        <p:nvPr/>
+      </p:nvGrpSpPr>
+      <p:grpSpPr>
+        <a:xfrm>
+          <a:off x="0" y="0"/>
+          <a:ext cx="0" cy="0"/>
+          <a:chOff x="0" y="0"/>
+          <a:chExt cx="0" cy="0"/>
+        </a:xfrm>
+      </p:grpSpPr>
+      <p:sp>
+        <p:nvSpPr>
+          <p:cNvPr id="2" name="Title 1">
+            <a:extLst>
+              <a:ext uri="{FF2B5EF4-FFF2-40B4-BE49-F238E27FC236}">
+                <a16:creationId xmlns:a16="http://schemas.microsoft.com/office/drawing/2014/main" id="{ADD5985E-7174-55E2-9ADB-76BCFFA1CC77}"/>
+              </a:ext>
+            </a:extLst>
+          </p:cNvPr>
+          <p:cNvSpPr>
+            <a:spLocks noGrp="1"/>
+          </p:cNvSpPr>
+          <p:nvPr>
+            <p:ph type="title"/>
+          </p:nvPr>
+        </p:nvSpPr>
+        <p:spPr/>
+        <p:txBody>
+          <a:bodyPr/>
+          <a:lstStyle/>
+          <a:p>
+            <a:pPr algn="ctr"/>
+            <a:r>
+              <a:rPr lang="en-AU" dirty="0"/>
               <a:t>Time vs Links Speed (30 mins)</a:t>
             </a:r>
           </a:p>
@@ -6925,7 +7165,7 @@
 </p:sld>
 </file>
 
-<file path=ppt/slides/slide31.xml><?xml version="1.0" encoding="utf-8"?>
+<file path=ppt/slides/slide32.xml><?xml version="1.0" encoding="utf-8"?>
 <p:sld xmlns:a="http://schemas.openxmlformats.org/drawingml/2006/main" xmlns:r="http://schemas.openxmlformats.org/officeDocument/2006/relationships" xmlns:p="http://schemas.openxmlformats.org/presentationml/2006/main">
   <p:cSld>
     <p:spTree>
@@ -7020,7 +7260,7 @@
 </p:sld>
 </file>
 
-<file path=ppt/slides/slide32.xml><?xml version="1.0" encoding="utf-8"?>
+<file path=ppt/slides/slide33.xml><?xml version="1.0" encoding="utf-8"?>
 <p:sld xmlns:a="http://schemas.openxmlformats.org/drawingml/2006/main" xmlns:r="http://schemas.openxmlformats.org/officeDocument/2006/relationships" xmlns:p="http://schemas.openxmlformats.org/presentationml/2006/main">
   <p:cSld>
     <p:spTree>
@@ -7115,7 +7355,7 @@
 </p:sld>
 </file>
 
-<file path=ppt/slides/slide33.xml><?xml version="1.0" encoding="utf-8"?>
+<file path=ppt/slides/slide34.xml><?xml version="1.0" encoding="utf-8"?>
 <p:sld xmlns:a="http://schemas.openxmlformats.org/drawingml/2006/main" xmlns:r="http://schemas.openxmlformats.org/officeDocument/2006/relationships" xmlns:p="http://schemas.openxmlformats.org/presentationml/2006/main">
   <p:cSld>
     <p:spTree>
@@ -7210,7 +7450,7 @@
 </p:sld>
 </file>
 
-<file path=ppt/slides/slide34.xml><?xml version="1.0" encoding="utf-8"?>
+<file path=ppt/slides/slide35.xml><?xml version="1.0" encoding="utf-8"?>
 <p:sld xmlns:a="http://schemas.openxmlformats.org/drawingml/2006/main" xmlns:r="http://schemas.openxmlformats.org/officeDocument/2006/relationships" xmlns:p="http://schemas.openxmlformats.org/presentationml/2006/main">
   <p:cSld>
     <p:spTree>
@@ -7305,97 +7545,6 @@
 </p:sld>
 </file>
 
-<file path=ppt/slides/slide35.xml><?xml version="1.0" encoding="utf-8"?>
-<p:sld xmlns:a="http://schemas.openxmlformats.org/drawingml/2006/main" xmlns:r="http://schemas.openxmlformats.org/officeDocument/2006/relationships" xmlns:p="http://schemas.openxmlformats.org/presentationml/2006/main">
-  <p:cSld>
-    <p:spTree>
-      <p:nvGrpSpPr>
-        <p:cNvPr id="1" name=""/>
-        <p:cNvGrpSpPr/>
-        <p:nvPr/>
-      </p:nvGrpSpPr>
-      <p:grpSpPr>
-        <a:xfrm>
-          <a:off x="0" y="0"/>
-          <a:ext cx="0" cy="0"/>
-          <a:chOff x="0" y="0"/>
-          <a:chExt cx="0" cy="0"/>
-        </a:xfrm>
-      </p:grpSpPr>
-      <p:sp>
-        <p:nvSpPr>
-          <p:cNvPr id="2" name="Title 1">
-            <a:extLst>
-              <a:ext uri="{FF2B5EF4-FFF2-40B4-BE49-F238E27FC236}">
-                <a16:creationId xmlns:a16="http://schemas.microsoft.com/office/drawing/2014/main" id="{C27E1182-0E96-8C1C-D16F-1722399E8E97}"/>
-              </a:ext>
-            </a:extLst>
-          </p:cNvPr>
-          <p:cNvSpPr>
-            <a:spLocks noGrp="1"/>
-          </p:cNvSpPr>
-          <p:nvPr>
-            <p:ph type="title"/>
-          </p:nvPr>
-        </p:nvSpPr>
-        <p:spPr/>
-        <p:txBody>
-          <a:bodyPr/>
-          <a:lstStyle/>
-          <a:p>
-            <a:pPr algn="ctr"/>
-            <a:r>
-              <a:rPr lang="en-AU" dirty="0"/>
-              <a:t>Conclusion</a:t>
-            </a:r>
-          </a:p>
-        </p:txBody>
-      </p:sp>
-      <p:sp>
-        <p:nvSpPr>
-          <p:cNvPr id="3" name="Content Placeholder 2">
-            <a:extLst>
-              <a:ext uri="{FF2B5EF4-FFF2-40B4-BE49-F238E27FC236}">
-                <a16:creationId xmlns:a16="http://schemas.microsoft.com/office/drawing/2014/main" id="{3C1A8A02-F91F-A7C4-308C-DFC59C1B5E5C}"/>
-              </a:ext>
-            </a:extLst>
-          </p:cNvPr>
-          <p:cNvSpPr>
-            <a:spLocks noGrp="1"/>
-          </p:cNvSpPr>
-          <p:nvPr>
-            <p:ph idx="1"/>
-          </p:nvPr>
-        </p:nvSpPr>
-        <p:spPr/>
-        <p:txBody>
-          <a:bodyPr/>
-          <a:lstStyle/>
-          <a:p>
-            <a:pPr marL="0" indent="0">
-              <a:buNone/>
-            </a:pPr>
-            <a:r>
-              <a:rPr lang="en-US" dirty="0"/>
-              <a:t>The figures show that average trip times increase along with congestion during the evening peak when leaving the city. Average trip times also increase in the morning towards the city, albeit to a much lesser extent</a:t>
-            </a:r>
-            <a:endParaRPr lang="en-AU" dirty="0"/>
-          </a:p>
-        </p:txBody>
-      </p:sp>
-    </p:spTree>
-    <p:extLst>
-      <p:ext uri="{BB962C8B-B14F-4D97-AF65-F5344CB8AC3E}">
-        <p14:creationId xmlns:p14="http://schemas.microsoft.com/office/powerpoint/2010/main" val="216016889"/>
-      </p:ext>
-    </p:extLst>
-  </p:cSld>
-  <p:clrMapOvr>
-    <a:masterClrMapping/>
-  </p:clrMapOvr>
-</p:sld>
-</file>
-
 <file path=ppt/slides/slide36.xml><?xml version="1.0" encoding="utf-8"?>
 <p:sld xmlns:a="http://schemas.openxmlformats.org/drawingml/2006/main" xmlns:r="http://schemas.openxmlformats.org/officeDocument/2006/relationships" xmlns:p="http://schemas.openxmlformats.org/presentationml/2006/main">
   <p:cSld>
@@ -7418,6 +7567,97 @@
           <p:cNvPr id="2" name="Title 1">
             <a:extLst>
               <a:ext uri="{FF2B5EF4-FFF2-40B4-BE49-F238E27FC236}">
+                <a16:creationId xmlns:a16="http://schemas.microsoft.com/office/drawing/2014/main" id="{C27E1182-0E96-8C1C-D16F-1722399E8E97}"/>
+              </a:ext>
+            </a:extLst>
+          </p:cNvPr>
+          <p:cNvSpPr>
+            <a:spLocks noGrp="1"/>
+          </p:cNvSpPr>
+          <p:nvPr>
+            <p:ph type="title"/>
+          </p:nvPr>
+        </p:nvSpPr>
+        <p:spPr/>
+        <p:txBody>
+          <a:bodyPr/>
+          <a:lstStyle/>
+          <a:p>
+            <a:pPr algn="ctr"/>
+            <a:r>
+              <a:rPr lang="en-AU" dirty="0"/>
+              <a:t>Conclusion</a:t>
+            </a:r>
+          </a:p>
+        </p:txBody>
+      </p:sp>
+      <p:sp>
+        <p:nvSpPr>
+          <p:cNvPr id="3" name="Content Placeholder 2">
+            <a:extLst>
+              <a:ext uri="{FF2B5EF4-FFF2-40B4-BE49-F238E27FC236}">
+                <a16:creationId xmlns:a16="http://schemas.microsoft.com/office/drawing/2014/main" id="{3C1A8A02-F91F-A7C4-308C-DFC59C1B5E5C}"/>
+              </a:ext>
+            </a:extLst>
+          </p:cNvPr>
+          <p:cNvSpPr>
+            <a:spLocks noGrp="1"/>
+          </p:cNvSpPr>
+          <p:nvPr>
+            <p:ph idx="1"/>
+          </p:nvPr>
+        </p:nvSpPr>
+        <p:spPr/>
+        <p:txBody>
+          <a:bodyPr/>
+          <a:lstStyle/>
+          <a:p>
+            <a:pPr marL="0" indent="0">
+              <a:buNone/>
+            </a:pPr>
+            <a:r>
+              <a:rPr lang="en-US" dirty="0"/>
+              <a:t>The figures show that average trip times increase along with congestion during the evening peak when leaving the city. Average trip times also increase in the morning towards the city, albeit to a much lesser extent</a:t>
+            </a:r>
+            <a:endParaRPr lang="en-AU" dirty="0"/>
+          </a:p>
+        </p:txBody>
+      </p:sp>
+    </p:spTree>
+    <p:extLst>
+      <p:ext uri="{BB962C8B-B14F-4D97-AF65-F5344CB8AC3E}">
+        <p14:creationId xmlns:p14="http://schemas.microsoft.com/office/powerpoint/2010/main" val="216016889"/>
+      </p:ext>
+    </p:extLst>
+  </p:cSld>
+  <p:clrMapOvr>
+    <a:masterClrMapping/>
+  </p:clrMapOvr>
+</p:sld>
+</file>
+
+<file path=ppt/slides/slide37.xml><?xml version="1.0" encoding="utf-8"?>
+<p:sld xmlns:a="http://schemas.openxmlformats.org/drawingml/2006/main" xmlns:r="http://schemas.openxmlformats.org/officeDocument/2006/relationships" xmlns:p="http://schemas.openxmlformats.org/presentationml/2006/main">
+  <p:cSld>
+    <p:spTree>
+      <p:nvGrpSpPr>
+        <p:cNvPr id="1" name=""/>
+        <p:cNvGrpSpPr/>
+        <p:nvPr/>
+      </p:nvGrpSpPr>
+      <p:grpSpPr>
+        <a:xfrm>
+          <a:off x="0" y="0"/>
+          <a:ext cx="0" cy="0"/>
+          <a:chOff x="0" y="0"/>
+          <a:chExt cx="0" cy="0"/>
+        </a:xfrm>
+      </p:grpSpPr>
+      <p:sp>
+        <p:nvSpPr>
+          <p:cNvPr id="2" name="Title 1">
+            <a:extLst>
+              <a:ext uri="{FF2B5EF4-FFF2-40B4-BE49-F238E27FC236}">
                 <a16:creationId xmlns:a16="http://schemas.microsoft.com/office/drawing/2014/main" id="{E591BC1F-469F-A469-85E2-E30668D52CB8}"/>
               </a:ext>
             </a:extLst>
@@ -7461,7 +7701,7 @@
         <p:spPr/>
         <p:txBody>
           <a:bodyPr>
-            <a:normAutofit fontScale="85000" lnSpcReduction="10000"/>
+            <a:normAutofit fontScale="62500" lnSpcReduction="20000"/>
           </a:bodyPr>
           <a:lstStyle/>
           <a:p>
@@ -7505,8 +7745,17 @@
             </a:pPr>
             <a:r>
               <a:rPr lang="en-US" dirty="0"/>
-              <a:t>Narrow the time or area scopes to produce outcomes of higher granularity</a:t>
-            </a:r>
+              <a:t>Performing the analysis on the same segment from </a:t>
+            </a:r>
+            <a:r>
+              <a:rPr lang="en-US"/>
+              <a:t>previous months </a:t>
+            </a:r>
+            <a:r>
+              <a:rPr lang="en-US" dirty="0"/>
+              <a:t>to highlight possible trends. This can identify areas where the congestion effect on bus travel times is accelerating at a higher pace</a:t>
+            </a:r>
+            <a:endParaRPr lang="en-AU" dirty="0"/>
           </a:p>
           <a:p>
             <a:pPr marL="514350" indent="-514350">
@@ -7522,7 +7771,7 @@
             </a:pPr>
             <a:r>
               <a:rPr lang="en-US" dirty="0"/>
-              <a:t>Identify bottlenecks in segments in terms of travel time and/or congestion</a:t>
+              <a:t>Narrow the time or area scopes to produce outcomes of higher granularity</a:t>
             </a:r>
           </a:p>
           <a:p>
@@ -7539,7 +7788,24 @@
             </a:pPr>
             <a:r>
               <a:rPr lang="en-US" dirty="0"/>
-              <a:t>Do travel times and/or congestion occur in specific areas or are they more distributed along the segments</a:t>
+              <a:t>Identify bottlenecks in segments in terms of travel time and/or congestion</a:t>
+            </a:r>
+          </a:p>
+          <a:p>
+            <a:pPr marL="514350" indent="-514350">
+              <a:buFont typeface="+mj-lt"/>
+              <a:buAutoNum type="arabicPeriod"/>
+            </a:pPr>
+            <a:endParaRPr lang="en-US" dirty="0"/>
+          </a:p>
+          <a:p>
+            <a:pPr marL="514350" indent="-514350">
+              <a:buFont typeface="+mj-lt"/>
+              <a:buAutoNum type="arabicPeriod"/>
+            </a:pPr>
+            <a:r>
+              <a:rPr lang="en-US" dirty="0"/>
+              <a:t>Do travel times and/or congestion occur in specific areas or are they more distributed along the segments?</a:t>
             </a:r>
           </a:p>
           <a:p>

</xml_diff>